<commit_message>
updated presentation and added english translation
</commit_message>
<xml_diff>
--- a/presentation/whymca11_morandi.pptx
+++ b/presentation/whymca11_morandi.pptx
@@ -249,7 +249,7 @@
             <a:fld id="{B10BA2A1-B447-294B-8BB2-A65ADB2585DB}" type="datetimeFigureOut">
               <a:rPr lang="it-IT" smtClean="0"/>
               <a:pPr/>
-              <a:t>20-05-2011</a:t>
+              <a:t>26-05-2011</a:t>
             </a:fld>
             <a:endParaRPr lang="it-IT"/>
           </a:p>
@@ -897,7 +897,7 @@
             <a:fld id="{92C6C67D-7F53-B24B-AF9B-1BA627256C69}" type="datetimeFigureOut">
               <a:rPr lang="it-IT" smtClean="0"/>
               <a:pPr/>
-              <a:t>20-05-2011</a:t>
+              <a:t>26-05-2011</a:t>
             </a:fld>
             <a:endParaRPr lang="it-IT"/>
           </a:p>
@@ -3438,14 +3438,7 @@
                 <a:latin typeface="Verdana"/>
                 <a:cs typeface="Verdana"/>
               </a:rPr>
-              <a:t> sviluppando moduli </a:t>
-            </a:r>
-            <a:r>
-              <a:rPr lang="it-IT" sz="2400" dirty="0" smtClean="0">
-                <a:latin typeface="Verdana"/>
-                <a:cs typeface="Verdana"/>
-              </a:rPr>
-              <a:t>nativi</a:t>
+              <a:t> sviluppando moduli nativi</a:t>
             </a:r>
             <a:endParaRPr lang="it-IT" sz="2400" dirty="0">
               <a:latin typeface="Verdana"/>
@@ -5482,11 +5475,7 @@
           <a:p>
             <a:r>
               <a:rPr lang="it-IT" dirty="0" smtClean="0"/>
-              <a:t>Accedere a funzionalità </a:t>
-            </a:r>
-            <a:r>
-              <a:rPr lang="it-IT" dirty="0" smtClean="0"/>
-              <a:t>specifiche del SO</a:t>
+              <a:t>Accedere a funzionalità specifiche del SO</a:t>
             </a:r>
           </a:p>
           <a:p>
@@ -6351,14 +6340,7 @@
                 <a:latin typeface="Courier New"/>
                 <a:cs typeface="Courier New"/>
               </a:rPr>
-              <a:t>}</a:t>
-            </a:r>
-            <a:r>
-              <a:rPr lang="it-IT" sz="2400" b="1" dirty="0" smtClean="0">
-                <a:latin typeface="Courier New"/>
-                <a:cs typeface="Courier New"/>
-              </a:rPr>
-              <a:t>);</a:t>
+              <a:t>});</a:t>
             </a:r>
           </a:p>
           <a:p>
@@ -9727,7 +9709,40 @@
                 <a:latin typeface="Courier New"/>
                 <a:cs typeface="Courier New"/>
               </a:rPr>
-              <a:t>’</a:t>
+              <a:t>’+14151234567'</a:t>
+            </a:r>
+            <a:r>
+              <a:rPr lang="it-IT" sz="2000" b="1" dirty="0" smtClean="0">
+                <a:latin typeface="Courier New"/>
+                <a:cs typeface="Courier New"/>
+              </a:rPr>
+              <a:t>];</a:t>
+            </a:r>
+          </a:p>
+          <a:p>
+            <a:pPr>
+              <a:buNone/>
+            </a:pPr>
+            <a:r>
+              <a:rPr lang="it-IT" sz="2000" b="1" dirty="0" smtClean="0">
+                <a:latin typeface="Courier New"/>
+                <a:cs typeface="Courier New"/>
+              </a:rPr>
+              <a:t>	</a:t>
+            </a:r>
+            <a:r>
+              <a:rPr lang="it-IT" sz="2000" b="1" dirty="0" err="1" smtClean="0">
+                <a:latin typeface="Courier New"/>
+                <a:cs typeface="Courier New"/>
+              </a:rPr>
+              <a:t>smsDialog.messageBody</a:t>
+            </a:r>
+            <a:r>
+              <a:rPr lang="it-IT" sz="2000" b="1" dirty="0" smtClean="0">
+                <a:latin typeface="Courier New"/>
+                <a:cs typeface="Courier New"/>
+              </a:rPr>
+              <a:t> = </a:t>
             </a:r>
             <a:r>
               <a:rPr lang="it-IT" sz="2000" b="1" dirty="0" smtClean="0">
@@ -9737,7 +9752,17 @@
                 <a:latin typeface="Courier New"/>
                 <a:cs typeface="Courier New"/>
               </a:rPr>
-              <a:t>+14151234567</a:t>
+              <a:t>'Test </a:t>
+            </a:r>
+            <a:r>
+              <a:rPr lang="it-IT" sz="2000" b="1" dirty="0" err="1" smtClean="0">
+                <a:solidFill>
+                  <a:srgbClr val="008000"/>
+                </a:solidFill>
+                <a:latin typeface="Courier New"/>
+                <a:cs typeface="Courier New"/>
+              </a:rPr>
+              <a:t>message</a:t>
             </a:r>
             <a:r>
               <a:rPr lang="it-IT" sz="2000" b="1" dirty="0" smtClean="0">
@@ -9747,40 +9772,17 @@
                 <a:latin typeface="Courier New"/>
                 <a:cs typeface="Courier New"/>
               </a:rPr>
-              <a:t>'</a:t>
-            </a:r>
-            <a:r>
-              <a:rPr lang="it-IT" sz="2000" b="1" dirty="0" smtClean="0">
-                <a:latin typeface="Courier New"/>
-                <a:cs typeface="Courier New"/>
-              </a:rPr>
-              <a:t>];</a:t>
-            </a:r>
-          </a:p>
-          <a:p>
-            <a:pPr>
-              <a:buNone/>
-            </a:pPr>
-            <a:r>
-              <a:rPr lang="it-IT" sz="2000" b="1" dirty="0" smtClean="0">
-                <a:latin typeface="Courier New"/>
-                <a:cs typeface="Courier New"/>
-              </a:rPr>
-              <a:t>	</a:t>
+              <a:t> </a:t>
             </a:r>
             <a:r>
               <a:rPr lang="it-IT" sz="2000" b="1" dirty="0" err="1" smtClean="0">
-                <a:latin typeface="Courier New"/>
-                <a:cs typeface="Courier New"/>
-              </a:rPr>
-              <a:t>smsDialog.messageBody</a:t>
-            </a:r>
-            <a:r>
-              <a:rPr lang="it-IT" sz="2000" b="1" dirty="0" smtClean="0">
-                <a:latin typeface="Courier New"/>
-                <a:cs typeface="Courier New"/>
-              </a:rPr>
-              <a:t> = </a:t>
+                <a:solidFill>
+                  <a:srgbClr val="008000"/>
+                </a:solidFill>
+                <a:latin typeface="Courier New"/>
+                <a:cs typeface="Courier New"/>
+              </a:rPr>
+              <a:t>from</a:t>
             </a:r>
             <a:r>
               <a:rPr lang="it-IT" sz="2000" b="1" dirty="0" smtClean="0">
@@ -9790,87 +9792,40 @@
                 <a:latin typeface="Courier New"/>
                 <a:cs typeface="Courier New"/>
               </a:rPr>
-              <a:t>'Test </a:t>
+              <a:t> me'</a:t>
+            </a:r>
+            <a:r>
+              <a:rPr lang="it-IT" sz="2000" b="1" dirty="0" smtClean="0">
+                <a:latin typeface="Courier New"/>
+                <a:cs typeface="Courier New"/>
+              </a:rPr>
+              <a:t>;</a:t>
+            </a:r>
+          </a:p>
+          <a:p>
+            <a:pPr>
+              <a:buNone/>
+            </a:pPr>
+            <a:r>
+              <a:rPr lang="it-IT" sz="2000" b="1" dirty="0" smtClean="0">
+                <a:latin typeface="Courier New"/>
+                <a:cs typeface="Courier New"/>
+              </a:rPr>
+              <a:t>	</a:t>
             </a:r>
             <a:r>
               <a:rPr lang="it-IT" sz="2000" b="1" dirty="0" err="1" smtClean="0">
-                <a:solidFill>
-                  <a:srgbClr val="008000"/>
-                </a:solidFill>
-                <a:latin typeface="Courier New"/>
-                <a:cs typeface="Courier New"/>
-              </a:rPr>
-              <a:t>message</a:t>
+                <a:latin typeface="Courier New"/>
+                <a:cs typeface="Courier New"/>
+              </a:rPr>
+              <a:t>smsDialog.barColor</a:t>
             </a:r>
             <a:r>
               <a:rPr lang="it-IT" sz="2000" b="1" dirty="0" smtClean="0">
-                <a:solidFill>
-                  <a:srgbClr val="008000"/>
-                </a:solidFill>
-                <a:latin typeface="Courier New"/>
-                <a:cs typeface="Courier New"/>
-              </a:rPr>
-              <a:t> </a:t>
-            </a:r>
-            <a:r>
-              <a:rPr lang="it-IT" sz="2000" b="1" dirty="0" err="1" smtClean="0">
-                <a:solidFill>
-                  <a:srgbClr val="008000"/>
-                </a:solidFill>
-                <a:latin typeface="Courier New"/>
-                <a:cs typeface="Courier New"/>
-              </a:rPr>
-              <a:t>from</a:t>
-            </a:r>
-            <a:r>
-              <a:rPr lang="it-IT" sz="2000" b="1" dirty="0" smtClean="0">
-                <a:solidFill>
-                  <a:srgbClr val="008000"/>
-                </a:solidFill>
-                <a:latin typeface="Courier New"/>
-                <a:cs typeface="Courier New"/>
-              </a:rPr>
-              <a:t> me'</a:t>
-            </a:r>
-            <a:r>
-              <a:rPr lang="it-IT" sz="2000" b="1" dirty="0" smtClean="0">
-                <a:latin typeface="Courier New"/>
-                <a:cs typeface="Courier New"/>
-              </a:rPr>
-              <a:t>;</a:t>
-            </a:r>
-          </a:p>
-          <a:p>
-            <a:pPr>
-              <a:buNone/>
-            </a:pPr>
-            <a:r>
-              <a:rPr lang="it-IT" sz="2000" b="1" dirty="0" smtClean="0">
-                <a:latin typeface="Courier New"/>
-                <a:cs typeface="Courier New"/>
-              </a:rPr>
-              <a:t>	</a:t>
-            </a:r>
-            <a:r>
-              <a:rPr lang="it-IT" sz="2000" b="1" dirty="0" err="1" smtClean="0">
-                <a:latin typeface="Courier New"/>
-                <a:cs typeface="Courier New"/>
-              </a:rPr>
-              <a:t>smsDialog.barColor</a:t>
-            </a:r>
-            <a:r>
-              <a:rPr lang="it-IT" sz="2000" b="1" dirty="0" smtClean="0">
-                <a:latin typeface="Courier New"/>
-                <a:cs typeface="Courier New"/>
-              </a:rPr>
-              <a:t> =</a:t>
-            </a:r>
-            <a:r>
-              <a:rPr lang="it-IT" sz="2000" b="1" dirty="0" smtClean="0">
-                <a:latin typeface="Courier New"/>
-                <a:cs typeface="Courier New"/>
-              </a:rPr>
-              <a:t> </a:t>
+                <a:latin typeface="Courier New"/>
+                <a:cs typeface="Courier New"/>
+              </a:rPr>
+              <a:t> = </a:t>
             </a:r>
             <a:r>
               <a:rPr lang="it-IT" sz="2000" b="1" dirty="0" smtClean="0">
@@ -10654,11 +10609,7 @@
             </a:r>
             <a:r>
               <a:rPr lang="it-IT" dirty="0" smtClean="0"/>
-              <a:t> (con sottoscrizione di licenza commerciale</a:t>
-            </a:r>
-            <a:r>
-              <a:rPr lang="it-IT" dirty="0" smtClean="0"/>
-              <a:t>)</a:t>
+              <a:t> (con sottoscrizione di licenza commerciale)</a:t>
             </a:r>
           </a:p>
           <a:p>
@@ -10689,25 +10640,12 @@
               <a:rPr lang="it-IT" sz="2595" dirty="0" smtClean="0">
                 <a:hlinkClick r:id="rId3"/>
               </a:rPr>
-              <a:t>https</a:t>
-            </a:r>
-            <a:r>
-              <a:rPr lang="it-IT" sz="2595" dirty="0" smtClean="0">
-                <a:hlinkClick r:id="rId3"/>
-              </a:rPr>
-              <a:t>://github.com/appcelerator/</a:t>
-            </a:r>
-            <a:r>
-              <a:rPr lang="it-IT" sz="2595" dirty="0" smtClean="0">
-                <a:hlinkClick r:id="rId3"/>
-              </a:rPr>
-              <a:t>titanium_mobile</a:t>
+              <a:t>https://github.com/appcelerator/titanium_mobile</a:t>
             </a:r>
             <a:r>
               <a:rPr lang="it-IT" dirty="0" smtClean="0"/>
               <a:t>   </a:t>
             </a:r>
-            <a:endParaRPr lang="it-IT" dirty="0" smtClean="0"/>
           </a:p>
           <a:p>
             <a:pPr>
@@ -13019,11 +12957,7 @@
           <a:p>
             <a:r>
               <a:rPr lang="it-IT" dirty="0" smtClean="0"/>
-              <a:t>Il nome della classe è</a:t>
-            </a:r>
-            <a:r>
-              <a:rPr lang="it-IT" dirty="0" smtClean="0"/>
-              <a:t> una trasposizione </a:t>
+              <a:t>Il nome della classe è una trasposizione </a:t>
             </a:r>
             <a:r>
               <a:rPr lang="it-IT" dirty="0" err="1" smtClean="0"/>
@@ -13031,11 +12965,7 @@
             </a:r>
             <a:r>
               <a:rPr lang="it-IT" dirty="0" smtClean="0"/>
-              <a:t> </a:t>
-            </a:r>
-            <a:r>
-              <a:rPr lang="it-IT" dirty="0" smtClean="0"/>
-              <a:t>dell’</a:t>
+              <a:t> dell’</a:t>
             </a:r>
             <a:r>
               <a:rPr lang="it-IT" dirty="0" err="1" smtClean="0"/>
@@ -13484,11 +13414,7 @@
           <a:p>
             <a:r>
               <a:rPr lang="it-IT" dirty="0" smtClean="0"/>
-              <a:t>Può esporre </a:t>
-            </a:r>
-            <a:r>
-              <a:rPr lang="it-IT" dirty="0" smtClean="0"/>
-              <a:t>proprietà e metodi che vogliamo rendere disponibili al codice </a:t>
+              <a:t>Può esporre proprietà e metodi che vogliamo rendere disponibili al codice </a:t>
             </a:r>
             <a:r>
               <a:rPr lang="it-IT" dirty="0" err="1" smtClean="0"/>
@@ -14306,11 +14232,7 @@
           <a:p>
             <a:r>
               <a:rPr lang="it-IT" dirty="0" smtClean="0"/>
-              <a:t>In ogni momento è possibile recuperare tali valori</a:t>
-            </a:r>
-            <a:r>
-              <a:rPr lang="it-IT" dirty="0" smtClean="0"/>
-              <a:t> da </a:t>
+              <a:t>In ogni momento è possibile recuperare tali valori da </a:t>
             </a:r>
             <a:r>
               <a:rPr lang="it-IT" dirty="0" err="1" smtClean="0"/>
@@ -14318,13 +14240,8 @@
             </a:r>
             <a:r>
               <a:rPr lang="it-IT" dirty="0" smtClean="0"/>
-              <a:t> grazie </a:t>
-            </a:r>
-            <a:r>
-              <a:rPr lang="it-IT" dirty="0" smtClean="0"/>
-              <a:t>al metodo </a:t>
-            </a:r>
-            <a:endParaRPr lang="it-IT" dirty="0" smtClean="0"/>
+              <a:t> grazie al metodo </a:t>
+            </a:r>
           </a:p>
           <a:p>
             <a:pPr>
@@ -14358,14 +14275,7 @@
                 <a:latin typeface="Courier New"/>
                 <a:cs typeface="Courier New"/>
               </a:rPr>
-              <a:t>self </a:t>
-            </a:r>
-            <a:r>
-              <a:rPr sz="2000" b="1" dirty="0" smtClean="0">
-                <a:latin typeface="Courier New"/>
-                <a:cs typeface="Courier New"/>
-              </a:rPr>
-              <a:t>valueForUndefinedKey:</a:t>
+              <a:t>self valueForUndefinedKey:</a:t>
             </a:r>
             <a:r>
               <a:rPr sz="2000" b="1" dirty="0" smtClean="0">
@@ -14576,14 +14486,7 @@
                 <a:latin typeface="Courier New"/>
                 <a:cs typeface="Courier New"/>
               </a:rPr>
-              <a:t>:[self</a:t>
-            </a:r>
-            <a:r>
-              <a:rPr lang="it-IT" sz="1730" b="1" dirty="0" smtClean="0">
-                <a:latin typeface="Courier New"/>
-                <a:cs typeface="Courier New"/>
-              </a:rPr>
-              <a:t> 	</a:t>
+              <a:t>:[self 	</a:t>
             </a:r>
             <a:r>
               <a:rPr lang="it-IT" sz="1730" b="1" dirty="0" err="1" smtClean="0">
@@ -14714,14 +14617,7 @@
                 <a:latin typeface="Courier New"/>
                 <a:cs typeface="Courier New"/>
               </a:rPr>
-              <a:t>:[self</a:t>
-            </a:r>
-            <a:r>
-              <a:rPr lang="it-IT" sz="1730" b="1" dirty="0" smtClean="0">
-                <a:latin typeface="Courier New"/>
-                <a:cs typeface="Courier New"/>
-              </a:rPr>
-              <a:t> 	</a:t>
+              <a:t>:[self 	</a:t>
             </a:r>
             <a:r>
               <a:rPr lang="it-IT" sz="1730" b="1" dirty="0" err="1" smtClean="0">
@@ -14882,17 +14778,7 @@
                 <a:latin typeface="Courier New"/>
                 <a:cs typeface="Courier New"/>
               </a:rPr>
-              <a:t>"</a:t>
-            </a:r>
-            <a:r>
-              <a:rPr lang="it-IT" sz="1730" b="1" dirty="0" smtClean="0">
-                <a:solidFill>
-                  <a:srgbClr val="FF6600"/>
-                </a:solidFill>
-                <a:latin typeface="Courier New"/>
-                <a:cs typeface="Courier New"/>
-              </a:rPr>
-              <a:t> 	</a:t>
+              <a:t>" 	</a:t>
             </a:r>
             <a:r>
               <a:rPr lang="it-IT" sz="1730" b="1" dirty="0" err="1" smtClean="0">
@@ -17096,7 +16982,6 @@
               <a:rPr lang="it-IT" dirty="0" smtClean="0"/>
               <a:t> </a:t>
             </a:r>
-            <a:endParaRPr lang="it-IT" dirty="0" smtClean="0"/>
           </a:p>
           <a:p>
             <a:pPr marL="450850" lvl="1" indent="6350">
@@ -17121,14 +17006,7 @@
                 <a:latin typeface="Courier New"/>
                 <a:cs typeface="Courier New"/>
               </a:rPr>
-              <a:t>name</a:t>
-            </a:r>
-            <a:r>
-              <a:rPr sz="2727" b="1" dirty="0" smtClean="0">
-                <a:latin typeface="Courier New"/>
-                <a:cs typeface="Courier New"/>
-              </a:rPr>
-              <a:t>:</a:t>
+              <a:t>name:</a:t>
             </a:r>
             <a:r>
               <a:rPr sz="2727" b="1" dirty="0" smtClean="0">
@@ -17244,11 +17122,7 @@
           <a:p>
             <a:r>
               <a:rPr lang="it-IT" dirty="0" smtClean="0"/>
-              <a:t>In tal caso si può utilizzare la </a:t>
-            </a:r>
-            <a:r>
-              <a:rPr lang="it-IT" dirty="0" smtClean="0"/>
-              <a:t>macro</a:t>
+              <a:t>In tal caso si può utilizzare la macro</a:t>
             </a:r>
           </a:p>
           <a:p>
@@ -18396,11 +18270,7 @@
             </a:r>
             <a:r>
               <a:rPr lang="it-IT" dirty="0" smtClean="0"/>
-              <a:t> del progetto del modulo direttamente </a:t>
-            </a:r>
-            <a:r>
-              <a:rPr lang="it-IT" dirty="0" smtClean="0"/>
-              <a:t>da </a:t>
+              <a:t> del progetto del modulo direttamente da </a:t>
             </a:r>
             <a:r>
               <a:rPr lang="it-IT" dirty="0" err="1" smtClean="0"/>
@@ -18963,7 +18833,6 @@
               <a:rPr lang="it-IT" dirty="0" smtClean="0"/>
               <a:t>Usare lo script</a:t>
             </a:r>
-            <a:endParaRPr lang="it-IT" dirty="0" smtClean="0"/>
           </a:p>
           <a:p>
             <a:pPr>
@@ -19102,10 +18971,6 @@
               </a:rPr>
               <a:t>com.whymca.smsdialog-iphone-0.1.zip</a:t>
             </a:r>
-            <a:endParaRPr lang="it-IT" b="1" dirty="0" smtClean="0">
-              <a:latin typeface="Courier New"/>
-              <a:cs typeface="Courier New"/>
-            </a:endParaRPr>
           </a:p>
           <a:p>
             <a:pPr>
@@ -19116,11 +18981,7 @@
           <a:p>
             <a:r>
               <a:rPr lang="it-IT" dirty="0" smtClean="0"/>
-              <a:t>Deve </a:t>
-            </a:r>
-            <a:r>
-              <a:rPr lang="it-IT" dirty="0" smtClean="0"/>
-              <a:t>essere decompresso nella directory</a:t>
+              <a:t>Deve essere decompresso nella directory</a:t>
             </a:r>
           </a:p>
           <a:p>
@@ -19570,10 +19431,6 @@
               </a:rPr>
               <a:t>"&gt;</a:t>
             </a:r>
-            <a:endParaRPr lang="it-IT" sz="2400" b="1" dirty="0" smtClean="0">
-              <a:latin typeface="Courier New"/>
-              <a:cs typeface="Courier New"/>
-            </a:endParaRPr>
           </a:p>
           <a:p>
             <a:pPr>
@@ -19931,10 +19788,6 @@
               </a:rPr>
               <a:t>&gt;</a:t>
             </a:r>
-            <a:endParaRPr lang="it-IT" sz="2400" b="1" dirty="0" smtClean="0">
-              <a:latin typeface="Courier New"/>
-              <a:cs typeface="Courier New"/>
-            </a:endParaRPr>
           </a:p>
           <a:p>
             <a:pPr>
@@ -20057,15 +19910,7 @@
           <a:p>
             <a:r>
               <a:rPr lang="it-IT" dirty="0" smtClean="0"/>
-              <a:t>Lanciare </a:t>
-            </a:r>
-            <a:r>
-              <a:rPr lang="it-IT" dirty="0" smtClean="0"/>
-              <a:t>l’esecuzione</a:t>
-            </a:r>
-            <a:r>
-              <a:rPr lang="it-IT" dirty="0" smtClean="0"/>
-              <a:t> dell’</a:t>
+              <a:t>Lanciare l’esecuzione dell’</a:t>
             </a:r>
             <a:r>
               <a:rPr lang="it-IT" dirty="0" err="1" smtClean="0"/>
@@ -20145,11 +19990,7 @@
             </a:r>
             <a:r>
               <a:rPr lang="it-IT" dirty="0" smtClean="0"/>
-              <a:t>da </a:t>
-            </a:r>
-            <a:r>
-              <a:rPr lang="it-IT" dirty="0" smtClean="0"/>
-              <a:t>lì</a:t>
+              <a:t>da lì</a:t>
             </a:r>
           </a:p>
           <a:p>
@@ -20264,6 +20105,99 @@
           </a:prstGeom>
         </p:spPr>
       </p:pic>
+      <p:sp>
+        <p:nvSpPr>
+          <p:cNvPr id="10" name="Ovale 9"/>
+          <p:cNvSpPr/>
+          <p:nvPr/>
+        </p:nvSpPr>
+        <p:spPr>
+          <a:xfrm>
+            <a:off x="5562600" y="274638"/>
+            <a:ext cx="1447800" cy="792162"/>
+          </a:xfrm>
+          <a:prstGeom prst="ellipse">
+            <a:avLst/>
+          </a:prstGeom>
+          <a:noFill/>
+          <a:ln>
+            <a:solidFill>
+              <a:schemeClr val="accent6">
+                <a:lumMod val="75000"/>
+              </a:schemeClr>
+            </a:solidFill>
+          </a:ln>
+        </p:spPr>
+        <p:style>
+          <a:lnRef idx="1">
+            <a:schemeClr val="accent1"/>
+          </a:lnRef>
+          <a:fillRef idx="3">
+            <a:schemeClr val="accent1"/>
+          </a:fillRef>
+          <a:effectRef idx="2">
+            <a:schemeClr val="accent1"/>
+          </a:effectRef>
+          <a:fontRef idx="minor">
+            <a:schemeClr val="lt1"/>
+          </a:fontRef>
+        </p:style>
+        <p:txBody>
+          <a:bodyPr rtlCol="0" anchor="ctr"/>
+          <a:lstStyle/>
+          <a:p>
+            <a:pPr algn="ctr"/>
+            <a:endParaRPr lang="it-IT"/>
+          </a:p>
+        </p:txBody>
+      </p:sp>
+      <p:sp>
+        <p:nvSpPr>
+          <p:cNvPr id="7" name="Rettangolo 6"/>
+          <p:cNvSpPr/>
+          <p:nvPr/>
+        </p:nvSpPr>
+        <p:spPr>
+          <a:xfrm>
+            <a:off x="2743200" y="3505200"/>
+            <a:ext cx="1371600" cy="1143000"/>
+          </a:xfrm>
+          <a:prstGeom prst="rect">
+            <a:avLst/>
+          </a:prstGeom>
+          <a:solidFill>
+            <a:srgbClr val="EDEDED"/>
+          </a:solidFill>
+          <a:ln>
+            <a:solidFill>
+              <a:srgbClr val="EDEDED"/>
+            </a:solidFill>
+          </a:ln>
+          <a:effectLst/>
+        </p:spPr>
+        <p:style>
+          <a:lnRef idx="1">
+            <a:schemeClr val="accent1"/>
+          </a:lnRef>
+          <a:fillRef idx="3">
+            <a:schemeClr val="accent1"/>
+          </a:fillRef>
+          <a:effectRef idx="2">
+            <a:schemeClr val="accent1"/>
+          </a:effectRef>
+          <a:fontRef idx="minor">
+            <a:schemeClr val="lt1"/>
+          </a:fontRef>
+        </p:style>
+        <p:txBody>
+          <a:bodyPr rtlCol="0" anchor="ctr"/>
+          <a:lstStyle/>
+          <a:p>
+            <a:pPr algn="ctr"/>
+            <a:endParaRPr lang="it-IT"/>
+          </a:p>
+        </p:txBody>
+      </p:sp>
       <p:cxnSp>
         <p:nvCxnSpPr>
           <p:cNvPr id="6" name="Connettore 7 5"/>
@@ -20305,52 +20239,6 @@
           </a:fontRef>
         </p:style>
       </p:cxnSp>
-      <p:sp>
-        <p:nvSpPr>
-          <p:cNvPr id="10" name="Ovale 9"/>
-          <p:cNvSpPr/>
-          <p:nvPr/>
-        </p:nvSpPr>
-        <p:spPr>
-          <a:xfrm>
-            <a:off x="5562600" y="274638"/>
-            <a:ext cx="1447800" cy="792162"/>
-          </a:xfrm>
-          <a:prstGeom prst="ellipse">
-            <a:avLst/>
-          </a:prstGeom>
-          <a:noFill/>
-          <a:ln>
-            <a:solidFill>
-              <a:schemeClr val="accent6">
-                <a:lumMod val="75000"/>
-              </a:schemeClr>
-            </a:solidFill>
-          </a:ln>
-        </p:spPr>
-        <p:style>
-          <a:lnRef idx="1">
-            <a:schemeClr val="accent1"/>
-          </a:lnRef>
-          <a:fillRef idx="3">
-            <a:schemeClr val="accent1"/>
-          </a:fillRef>
-          <a:effectRef idx="2">
-            <a:schemeClr val="accent1"/>
-          </a:effectRef>
-          <a:fontRef idx="minor">
-            <a:schemeClr val="lt1"/>
-          </a:fontRef>
-        </p:style>
-        <p:txBody>
-          <a:bodyPr rtlCol="0" anchor="ctr"/>
-          <a:lstStyle/>
-          <a:p>
-            <a:pPr algn="ctr"/>
-            <a:endParaRPr lang="it-IT"/>
-          </a:p>
-        </p:txBody>
-      </p:sp>
     </p:spTree>
   </p:cSld>
   <p:clrMapOvr>

</xml_diff>